<commit_message>
Deploying to gh-pages from @ matthewjberger/trust@8f78a0c95d1362efb78049cd1140026700bbadb0 🚀
</commit_message>
<xml_diff>
--- a/README.pptx
+++ b/README.pptx
@@ -18,10 +18,9 @@
     <p:sldId id="266" r:id="rId12"/>
     <p:sldId id="267" r:id="rId13"/>
     <p:sldId id="268" r:id="rId14"/>
-    <p:sldId id="269" r:id="rId15"/>
   </p:sldIdLst>
   <p:notesMasterIdLst>
-    <p:notesMasterId r:id="rId16"/>
+    <p:notesMasterId r:id="rId15"/>
   </p:notesMasterIdLst>
   <p:sldSz cx="12192000" cy="6858000"/>
   <p:notesSz cx="6858000" cy="12192000"/>
@@ -603,7 +602,9 @@
           <a:p>
             <a:r>
               <a:rPr lang="en-US" dirty="0"/>
-              <a:t/>
+              <a:t>Now we need a way to represent the dog having a bone or not having a bone.
+We can represent this using the `Option` type.
+`Option` is a generic enumeration with two variants.</a:t>
             </a:r>
             <a:endParaRPr lang="en-US" dirty="0"/>
           </a:p>
@@ -691,7 +692,7 @@
           <a:p>
             <a:r>
               <a:rPr lang="en-US" dirty="0"/>
-              <a:t/>
+              <a:t>Let's add an optional `bone` field to our `Dog`.</a:t>
             </a:r>
             <a:endParaRPr lang="en-US" dirty="0"/>
           </a:p>
@@ -779,7 +780,13 @@
           <a:p>
             <a:r>
               <a:rPr lang="en-US" dirty="0"/>
-              <a:t/>
+              <a:t>Now our dog can hold onto a Bone!
+However, things get more complicated when we want to start giving and taking bones.
+What if the dog already has a bone?
+What if the dog doesn't like the flavor?
+What if the dog refuses to take the bone?
+In the next section, we'll cover how to handle fallibility in our program.
+First, we will take a look at the full program so far.</a:t>
             </a:r>
             <a:endParaRPr lang="en-US" dirty="0"/>
           </a:p>
@@ -909,7 +916,7 @@
 </p:notes>
 </file>
 
-<file path=ppt/notesSlides/notesSlide14.xml><?xml version="1.0" encoding="utf-8"?>
+<file path=ppt/notesSlides/notesSlide2.xml><?xml version="1.0" encoding="utf-8"?>
 <p:notes xmlns:a="http://schemas.openxmlformats.org/drawingml/2006/main" xmlns:r="http://schemas.openxmlformats.org/officeDocument/2006/relationships" xmlns:p="http://schemas.openxmlformats.org/presentationml/2006/main">
   <p:cSld>
     <p:spTree>
@@ -978,7 +985,7 @@
           <a:p>
             <a:fld id="{F7021451-1387-4CA6-816F-3879F97B5CBC}" type="slidenum">
               <a:rPr lang="en-US"/>
-              <a:t>14</a:t>
+              <a:t>2</a:t>
             </a:fld>
             <a:endParaRPr lang="en-US"/>
           </a:p>
@@ -997,7 +1004,7 @@
 </p:notes>
 </file>
 
-<file path=ppt/notesSlides/notesSlide2.xml><?xml version="1.0" encoding="utf-8"?>
+<file path=ppt/notesSlides/notesSlide3.xml><?xml version="1.0" encoding="utf-8"?>
 <p:notes xmlns:a="http://schemas.openxmlformats.org/drawingml/2006/main" xmlns:r="http://schemas.openxmlformats.org/officeDocument/2006/relationships" xmlns:p="http://schemas.openxmlformats.org/presentationml/2006/main">
   <p:cSld>
     <p:spTree>
@@ -1066,7 +1073,7 @@
           <a:p>
             <a:fld id="{F7021451-1387-4CA6-816F-3879F97B5CBC}" type="slidenum">
               <a:rPr lang="en-US"/>
-              <a:t>2</a:t>
+              <a:t>3</a:t>
             </a:fld>
             <a:endParaRPr lang="en-US"/>
           </a:p>
@@ -1085,7 +1092,7 @@
 </p:notes>
 </file>
 
-<file path=ppt/notesSlides/notesSlide3.xml><?xml version="1.0" encoding="utf-8"?>
+<file path=ppt/notesSlides/notesSlide4.xml><?xml version="1.0" encoding="utf-8"?>
 <p:notes xmlns:a="http://schemas.openxmlformats.org/drawingml/2006/main" xmlns:r="http://schemas.openxmlformats.org/officeDocument/2006/relationships" xmlns:p="http://schemas.openxmlformats.org/presentationml/2006/main">
   <p:cSld>
     <p:spTree>
@@ -1154,7 +1161,7 @@
           <a:p>
             <a:fld id="{F7021451-1387-4CA6-816F-3879F97B5CBC}" type="slidenum">
               <a:rPr lang="en-US"/>
-              <a:t>3</a:t>
+              <a:t>4</a:t>
             </a:fld>
             <a:endParaRPr lang="en-US"/>
           </a:p>
@@ -1173,7 +1180,7 @@
 </p:notes>
 </file>
 
-<file path=ppt/notesSlides/notesSlide4.xml><?xml version="1.0" encoding="utf-8"?>
+<file path=ppt/notesSlides/notesSlide5.xml><?xml version="1.0" encoding="utf-8"?>
 <p:notes xmlns:a="http://schemas.openxmlformats.org/drawingml/2006/main" xmlns:r="http://schemas.openxmlformats.org/officeDocument/2006/relationships" xmlns:p="http://schemas.openxmlformats.org/presentationml/2006/main">
   <p:cSld>
     <p:spTree>
@@ -1242,7 +1249,7 @@
           <a:p>
             <a:fld id="{F7021451-1387-4CA6-816F-3879F97B5CBC}" type="slidenum">
               <a:rPr lang="en-US"/>
-              <a:t>4</a:t>
+              <a:t>5</a:t>
             </a:fld>
             <a:endParaRPr lang="en-US"/>
           </a:p>
@@ -1261,7 +1268,7 @@
 </p:notes>
 </file>
 
-<file path=ppt/notesSlides/notesSlide5.xml><?xml version="1.0" encoding="utf-8"?>
+<file path=ppt/notesSlides/notesSlide6.xml><?xml version="1.0" encoding="utf-8"?>
 <p:notes xmlns:a="http://schemas.openxmlformats.org/drawingml/2006/main" xmlns:r="http://schemas.openxmlformats.org/officeDocument/2006/relationships" xmlns:p="http://schemas.openxmlformats.org/presentationml/2006/main">
   <p:cSld>
     <p:spTree>
@@ -1307,7 +1314,7 @@
           <a:p>
             <a:r>
               <a:rPr lang="en-US" dirty="0"/>
-              <a:t/>
+              <a:t>Everyone loves pets, so let's start by adding a pet to our project.</a:t>
             </a:r>
             <a:endParaRPr lang="en-US" dirty="0"/>
           </a:p>
@@ -1330,7 +1337,7 @@
           <a:p>
             <a:fld id="{F7021451-1387-4CA6-816F-3879F97B5CBC}" type="slidenum">
               <a:rPr lang="en-US"/>
-              <a:t>5</a:t>
+              <a:t>6</a:t>
             </a:fld>
             <a:endParaRPr lang="en-US"/>
           </a:p>
@@ -1349,7 +1356,7 @@
 </p:notes>
 </file>
 
-<file path=ppt/notesSlides/notesSlide6.xml><?xml version="1.0" encoding="utf-8"?>
+<file path=ppt/notesSlides/notesSlide7.xml><?xml version="1.0" encoding="utf-8"?>
 <p:notes xmlns:a="http://schemas.openxmlformats.org/drawingml/2006/main" xmlns:r="http://schemas.openxmlformats.org/officeDocument/2006/relationships" xmlns:p="http://schemas.openxmlformats.org/presentationml/2006/main">
   <p:cSld>
     <p:spTree>
@@ -1395,7 +1402,9 @@
           <a:p>
             <a:r>
               <a:rPr lang="en-US" dirty="0"/>
-              <a:t/>
+              <a:t>Let's give our dog an age and make it possible for them to celebrate their birthday. 
+  Note that we have to add the mut keyword to the dog to be able to mutate it. In this case, the mutation is incrementing its age when celebrating its birthday.
+  In Rust, objects are immutable by default.</a:t>
             </a:r>
             <a:endParaRPr lang="en-US" dirty="0"/>
           </a:p>
@@ -1418,7 +1427,7 @@
           <a:p>
             <a:fld id="{F7021451-1387-4CA6-816F-3879F97B5CBC}" type="slidenum">
               <a:rPr lang="en-US"/>
-              <a:t>6</a:t>
+              <a:t>7</a:t>
             </a:fld>
             <a:endParaRPr lang="en-US"/>
           </a:p>
@@ -1437,7 +1446,7 @@
 </p:notes>
 </file>
 
-<file path=ppt/notesSlides/notesSlide7.xml><?xml version="1.0" encoding="utf-8"?>
+<file path=ppt/notesSlides/notesSlide8.xml><?xml version="1.0" encoding="utf-8"?>
 <p:notes xmlns:a="http://schemas.openxmlformats.org/drawingml/2006/main" xmlns:r="http://schemas.openxmlformats.org/officeDocument/2006/relationships" xmlns:p="http://schemas.openxmlformats.org/presentationml/2006/main">
   <p:cSld>
     <p:spTree>
@@ -1483,7 +1492,9 @@
           <a:p>
             <a:r>
               <a:rPr lang="en-US" dirty="0"/>
-              <a:t/>
+              <a:t>Constructors in Rust are just functions that return an instance of an object. They are not treated specially by the language itself like they are in C++.
+Because they do not take `self` as a parameter,
+they are considered `associated functions` instead of `methods`.</a:t>
             </a:r>
             <a:endParaRPr lang="en-US" dirty="0"/>
           </a:p>
@@ -1506,7 +1517,7 @@
           <a:p>
             <a:fld id="{F7021451-1387-4CA6-816F-3879F97B5CBC}" type="slidenum">
               <a:rPr lang="en-US"/>
-              <a:t>7</a:t>
+              <a:t>8</a:t>
             </a:fld>
             <a:endParaRPr lang="en-US"/>
           </a:p>
@@ -1525,94 +1536,6 @@
 </p:notes>
 </file>
 
-<file path=ppt/notesSlides/notesSlide8.xml><?xml version="1.0" encoding="utf-8"?>
-<p:notes xmlns:a="http://schemas.openxmlformats.org/drawingml/2006/main" xmlns:r="http://schemas.openxmlformats.org/officeDocument/2006/relationships" xmlns:p="http://schemas.openxmlformats.org/presentationml/2006/main">
-  <p:cSld>
-    <p:spTree>
-      <p:nvGrpSpPr>
-        <p:cNvPr id="1" name=""/>
-        <p:cNvGrpSpPr/>
-        <p:nvPr/>
-      </p:nvGrpSpPr>
-      <p:grpSpPr>
-        <a:xfrm>
-          <a:off x="0" y="0"/>
-          <a:ext cx="0" cy="0"/>
-          <a:chOff x="0" y="0"/>
-          <a:chExt cx="0" cy="0"/>
-        </a:xfrm>
-      </p:grpSpPr>
-      <p:sp>
-        <p:nvSpPr>
-          <p:cNvPr id="2" name="Slide Image Placeholder 1"/>
-          <p:cNvSpPr>
-            <a:spLocks noGrp="1" noRot="1" noChangeAspect="1"/>
-          </p:cNvSpPr>
-          <p:nvPr>
-            <p:ph type="sldImg"/>
-          </p:nvPr>
-        </p:nvSpPr>
-        <p:spPr/>
-      </p:sp>
-      <p:sp>
-        <p:nvSpPr>
-          <p:cNvPr id="3" name="Notes Placeholder 2"/>
-          <p:cNvSpPr>
-            <a:spLocks noGrp="1"/>
-          </p:cNvSpPr>
-          <p:nvPr>
-            <p:ph type="body" idx="1"/>
-          </p:nvPr>
-        </p:nvSpPr>
-        <p:spPr/>
-        <p:txBody>
-          <a:bodyPr/>
-          <a:lstStyle/>
-          <a:p>
-            <a:r>
-              <a:rPr lang="en-US" dirty="0"/>
-              <a:t/>
-            </a:r>
-            <a:endParaRPr lang="en-US" dirty="0"/>
-          </a:p>
-        </p:txBody>
-      </p:sp>
-      <p:sp>
-        <p:nvSpPr>
-          <p:cNvPr id="4" name="Slide Number Placeholder 3"/>
-          <p:cNvSpPr>
-            <a:spLocks noGrp="1"/>
-          </p:cNvSpPr>
-          <p:nvPr>
-            <p:ph type="sldNum" sz="quarter" idx="10"/>
-          </p:nvPr>
-        </p:nvSpPr>
-        <p:spPr/>
-        <p:txBody>
-          <a:bodyPr/>
-          <a:lstStyle/>
-          <a:p>
-            <a:fld id="{F7021451-1387-4CA6-816F-3879F97B5CBC}" type="slidenum">
-              <a:rPr lang="en-US"/>
-              <a:t>8</a:t>
-            </a:fld>
-            <a:endParaRPr lang="en-US"/>
-          </a:p>
-        </p:txBody>
-      </p:sp>
-    </p:spTree>
-    <p:extLst>
-      <p:ext uri="{BB962C8B-B14F-4D97-AF65-F5344CB8AC3E}">
-        <p14:creationId xmlns:p14="http://schemas.microsoft.com/office/powerpoint/2010/main" val="1024086991"/>
-      </p:ext>
-    </p:extLst>
-  </p:cSld>
-  <p:clrMapOvr>
-    <a:masterClrMapping/>
-  </p:clrMapOvr>
-</p:notes>
-</file>
-
 <file path=ppt/notesSlides/notesSlide9.xml><?xml version="1.0" encoding="utf-8"?>
 <p:notes xmlns:a="http://schemas.openxmlformats.org/drawingml/2006/main" xmlns:r="http://schemas.openxmlformats.org/officeDocument/2006/relationships" xmlns:p="http://schemas.openxmlformats.org/presentationml/2006/main">
   <p:cSld>
@@ -1659,7 +1582,7 @@
           <a:p>
             <a:r>
               <a:rPr lang="en-US" dirty="0"/>
-              <a:t/>
+              <a:t>Now we can add an enumeration to our program the represents various bone flavors.</a:t>
             </a:r>
             <a:endParaRPr lang="en-US" dirty="0"/>
           </a:p>
@@ -2167,45 +2090,6 @@
 <file path=ppt/slides/slide13.xml><?xml version="1.0" encoding="utf-8"?>
 <p:sld xmlns:a="http://schemas.openxmlformats.org/drawingml/2006/main" xmlns:r="http://schemas.openxmlformats.org/officeDocument/2006/relationships" xmlns:p="http://schemas.openxmlformats.org/presentationml/2006/main">
   <p:cSld name="Slide 13">
-    <p:bg>
-      <p:bgPr>
-        <a:blipFill dpi="0" rotWithShape="1">
-          <a:blip r:embed="rId1">
-            <a:lum/>
-          </a:blip>
-          <a:srcRect/>
-          <a:stretch>
-            <a:fillRect/>
-          </a:stretch>
-        </a:blipFill>
-        <a:effectLst/>
-      </p:bgPr>
-    </p:bg>
-    <p:spTree>
-      <p:nvGrpSpPr>
-        <p:cNvPr id="1" name=""/>
-        <p:cNvGrpSpPr/>
-        <p:nvPr/>
-      </p:nvGrpSpPr>
-      <p:grpSpPr>
-        <a:xfrm>
-          <a:off x="0" y="0"/>
-          <a:ext cx="0" cy="0"/>
-          <a:chOff x="0" y="0"/>
-          <a:chExt cx="0" cy="0"/>
-        </a:xfrm>
-      </p:grpSpPr>
-    </p:spTree>
-  </p:cSld>
-  <p:clrMapOvr>
-    <a:masterClrMapping/>
-  </p:clrMapOvr>
-</p:sld>
-</file>
-
-<file path=ppt/slides/slide14.xml><?xml version="1.0" encoding="utf-8"?>
-<p:sld xmlns:a="http://schemas.openxmlformats.org/drawingml/2006/main" xmlns:r="http://schemas.openxmlformats.org/officeDocument/2006/relationships" xmlns:p="http://schemas.openxmlformats.org/presentationml/2006/main">
-  <p:cSld name="Slide 14">
     <p:bg>
       <p:bgPr>
         <a:blipFill dpi="0" rotWithShape="1">

</xml_diff>

<commit_message>
Deploying to gh-pages from @ matthewjberger/trust@2425f02321393e6d4390dc48c642fe476734e90d 🚀
</commit_message>
<xml_diff>
--- a/README.pptx
+++ b/README.pptx
@@ -18,9 +18,19 @@
     <p:sldId id="266" r:id="rId12"/>
     <p:sldId id="267" r:id="rId13"/>
     <p:sldId id="268" r:id="rId14"/>
+    <p:sldId id="269" r:id="rId15"/>
+    <p:sldId id="270" r:id="rId16"/>
+    <p:sldId id="271" r:id="rId17"/>
+    <p:sldId id="272" r:id="rId18"/>
+    <p:sldId id="273" r:id="rId19"/>
+    <p:sldId id="274" r:id="rId20"/>
+    <p:sldId id="275" r:id="rId21"/>
+    <p:sldId id="276" r:id="rId22"/>
+    <p:sldId id="277" r:id="rId23"/>
+    <p:sldId id="278" r:id="rId24"/>
   </p:sldIdLst>
   <p:notesMasterIdLst>
-    <p:notesMasterId r:id="rId15"/>
+    <p:notesMasterId r:id="rId25"/>
   </p:notesMasterIdLst>
   <p:sldSz cx="12192000" cy="6858000"/>
   <p:notesSz cx="6858000" cy="12192000"/>
@@ -916,6 +926,545 @@
 </p:notes>
 </file>
 
+<file path=ppt/notesSlides/notesSlide14.xml><?xml version="1.0" encoding="utf-8"?>
+<p:notes xmlns:a="http://schemas.openxmlformats.org/drawingml/2006/main" xmlns:r="http://schemas.openxmlformats.org/officeDocument/2006/relationships" xmlns:p="http://schemas.openxmlformats.org/presentationml/2006/main">
+  <p:cSld>
+    <p:spTree>
+      <p:nvGrpSpPr>
+        <p:cNvPr id="1" name=""/>
+        <p:cNvGrpSpPr/>
+        <p:nvPr/>
+      </p:nvGrpSpPr>
+      <p:grpSpPr>
+        <a:xfrm>
+          <a:off x="0" y="0"/>
+          <a:ext cx="0" cy="0"/>
+          <a:chOff x="0" y="0"/>
+          <a:chExt cx="0" cy="0"/>
+        </a:xfrm>
+      </p:grpSpPr>
+      <p:sp>
+        <p:nvSpPr>
+          <p:cNvPr id="2" name="Slide Image Placeholder 1"/>
+          <p:cNvSpPr>
+            <a:spLocks noGrp="1" noRot="1" noChangeAspect="1"/>
+          </p:cNvSpPr>
+          <p:nvPr>
+            <p:ph type="sldImg"/>
+          </p:nvPr>
+        </p:nvSpPr>
+        <p:spPr/>
+      </p:sp>
+      <p:sp>
+        <p:nvSpPr>
+          <p:cNvPr id="3" name="Notes Placeholder 2"/>
+          <p:cNvSpPr>
+            <a:spLocks noGrp="1"/>
+          </p:cNvSpPr>
+          <p:nvPr>
+            <p:ph type="body" idx="1"/>
+          </p:nvPr>
+        </p:nvSpPr>
+        <p:spPr/>
+        <p:txBody>
+          <a:bodyPr/>
+          <a:lstStyle/>
+          <a:p>
+            <a:r>
+              <a:rPr lang="en-US" dirty="0"/>
+              <a:t>Now we want to be able to give the dog a bone and take it away to throw for fetching. These operations can fail for various reasons.
+We can represent fallible operations by making them return a Result type, and we will specify our own Error type.</a:t>
+            </a:r>
+            <a:endParaRPr lang="en-US" dirty="0"/>
+          </a:p>
+        </p:txBody>
+      </p:sp>
+      <p:sp>
+        <p:nvSpPr>
+          <p:cNvPr id="4" name="Slide Number Placeholder 3"/>
+          <p:cNvSpPr>
+            <a:spLocks noGrp="1"/>
+          </p:cNvSpPr>
+          <p:nvPr>
+            <p:ph type="sldNum" sz="quarter" idx="10"/>
+          </p:nvPr>
+        </p:nvSpPr>
+        <p:spPr/>
+        <p:txBody>
+          <a:bodyPr/>
+          <a:lstStyle/>
+          <a:p>
+            <a:fld id="{F7021451-1387-4CA6-816F-3879F97B5CBC}" type="slidenum">
+              <a:rPr lang="en-US"/>
+              <a:t>14</a:t>
+            </a:fld>
+            <a:endParaRPr lang="en-US"/>
+          </a:p>
+        </p:txBody>
+      </p:sp>
+    </p:spTree>
+    <p:extLst>
+      <p:ext uri="{BB962C8B-B14F-4D97-AF65-F5344CB8AC3E}">
+        <p14:creationId xmlns:p14="http://schemas.microsoft.com/office/powerpoint/2010/main" val="1024086991"/>
+      </p:ext>
+    </p:extLst>
+  </p:cSld>
+  <p:clrMapOvr>
+    <a:masterClrMapping/>
+  </p:clrMapOvr>
+</p:notes>
+</file>
+
+<file path=ppt/notesSlides/notesSlide15.xml><?xml version="1.0" encoding="utf-8"?>
+<p:notes xmlns:a="http://schemas.openxmlformats.org/drawingml/2006/main" xmlns:r="http://schemas.openxmlformats.org/officeDocument/2006/relationships" xmlns:p="http://schemas.openxmlformats.org/presentationml/2006/main">
+  <p:cSld>
+    <p:spTree>
+      <p:nvGrpSpPr>
+        <p:cNvPr id="1" name=""/>
+        <p:cNvGrpSpPr/>
+        <p:nvPr/>
+      </p:nvGrpSpPr>
+      <p:grpSpPr>
+        <a:xfrm>
+          <a:off x="0" y="0"/>
+          <a:ext cx="0" cy="0"/>
+          <a:chOff x="0" y="0"/>
+          <a:chExt cx="0" cy="0"/>
+        </a:xfrm>
+      </p:grpSpPr>
+      <p:sp>
+        <p:nvSpPr>
+          <p:cNvPr id="2" name="Slide Image Placeholder 1"/>
+          <p:cNvSpPr>
+            <a:spLocks noGrp="1" noRot="1" noChangeAspect="1"/>
+          </p:cNvSpPr>
+          <p:nvPr>
+            <p:ph type="sldImg"/>
+          </p:nvPr>
+        </p:nvSpPr>
+        <p:spPr/>
+      </p:sp>
+      <p:sp>
+        <p:nvSpPr>
+          <p:cNvPr id="3" name="Notes Placeholder 2"/>
+          <p:cNvSpPr>
+            <a:spLocks noGrp="1"/>
+          </p:cNvSpPr>
+          <p:nvPr>
+            <p:ph type="body" idx="1"/>
+          </p:nvPr>
+        </p:nvSpPr>
+        <p:spPr/>
+        <p:txBody>
+          <a:bodyPr/>
+          <a:lstStyle/>
+          <a:p>
+            <a:r>
+              <a:rPr lang="en-US" dirty="0"/>
+              <a:t>To understand the next section explaining errors, we'll need to discuss the concept of traits. Traits are like interfaces in other languages, except in Rust, traits only specify behavior and not data. Traits only represent functions and not variables. There is a `std::error::Error` trait that the Result type uses as a type-constraint on its generic Error parameter. Result can only accept error types that implement the `std::error::Error` trait.
+For us to create a custom error type we have to implement the `std::error::Error` trait on our AnimalError custom error type.
+We can implement other similar traits as well, such as Display. Display specifies how an object should present itself in a user-facing for text. The equivalent for debugging is called Debug.
+Traits allow rust to use dynamic dispatch, which is the process of selecting which implementation of a polymorphic operation (method or function) to call at run time.</a:t>
+            </a:r>
+            <a:endParaRPr lang="en-US" dirty="0"/>
+          </a:p>
+        </p:txBody>
+      </p:sp>
+      <p:sp>
+        <p:nvSpPr>
+          <p:cNvPr id="4" name="Slide Number Placeholder 3"/>
+          <p:cNvSpPr>
+            <a:spLocks noGrp="1"/>
+          </p:cNvSpPr>
+          <p:nvPr>
+            <p:ph type="sldNum" sz="quarter" idx="10"/>
+          </p:nvPr>
+        </p:nvSpPr>
+        <p:spPr/>
+        <p:txBody>
+          <a:bodyPr/>
+          <a:lstStyle/>
+          <a:p>
+            <a:fld id="{F7021451-1387-4CA6-816F-3879F97B5CBC}" type="slidenum">
+              <a:rPr lang="en-US"/>
+              <a:t>15</a:t>
+            </a:fld>
+            <a:endParaRPr lang="en-US"/>
+          </a:p>
+        </p:txBody>
+      </p:sp>
+    </p:spTree>
+    <p:extLst>
+      <p:ext uri="{BB962C8B-B14F-4D97-AF65-F5344CB8AC3E}">
+        <p14:creationId xmlns:p14="http://schemas.microsoft.com/office/powerpoint/2010/main" val="1024086991"/>
+      </p:ext>
+    </p:extLst>
+  </p:cSld>
+  <p:clrMapOvr>
+    <a:masterClrMapping/>
+  </p:clrMapOvr>
+</p:notes>
+</file>
+
+<file path=ppt/notesSlides/notesSlide16.xml><?xml version="1.0" encoding="utf-8"?>
+<p:notes xmlns:a="http://schemas.openxmlformats.org/drawingml/2006/main" xmlns:r="http://schemas.openxmlformats.org/officeDocument/2006/relationships" xmlns:p="http://schemas.openxmlformats.org/presentationml/2006/main">
+  <p:cSld>
+    <p:spTree>
+      <p:nvGrpSpPr>
+        <p:cNvPr id="1" name=""/>
+        <p:cNvGrpSpPr/>
+        <p:nvPr/>
+      </p:nvGrpSpPr>
+      <p:grpSpPr>
+        <a:xfrm>
+          <a:off x="0" y="0"/>
+          <a:ext cx="0" cy="0"/>
+          <a:chOff x="0" y="0"/>
+          <a:chExt cx="0" cy="0"/>
+        </a:xfrm>
+      </p:grpSpPr>
+      <p:sp>
+        <p:nvSpPr>
+          <p:cNvPr id="2" name="Slide Image Placeholder 1"/>
+          <p:cNvSpPr>
+            <a:spLocks noGrp="1" noRot="1" noChangeAspect="1"/>
+          </p:cNvSpPr>
+          <p:nvPr>
+            <p:ph type="sldImg"/>
+          </p:nvPr>
+        </p:nvSpPr>
+        <p:spPr/>
+      </p:sp>
+      <p:sp>
+        <p:nvSpPr>
+          <p:cNvPr id="3" name="Notes Placeholder 2"/>
+          <p:cNvSpPr>
+            <a:spLocks noGrp="1"/>
+          </p:cNvSpPr>
+          <p:nvPr>
+            <p:ph type="body" idx="1"/>
+          </p:nvPr>
+        </p:nvSpPr>
+        <p:spPr/>
+        <p:txBody>
+          <a:bodyPr/>
+          <a:lstStyle/>
+          <a:p>
+            <a:r>
+              <a:rPr lang="en-US" dirty="0"/>
+              <a:t>To represent an error when interacting with an animal, we can create a custom error type.
+Here we have a custom `AnimalError` type that stores a string for error details.
+We also implement Display on it so it can be printed to the console.</a:t>
+            </a:r>
+            <a:endParaRPr lang="en-US" dirty="0"/>
+          </a:p>
+        </p:txBody>
+      </p:sp>
+      <p:sp>
+        <p:nvSpPr>
+          <p:cNvPr id="4" name="Slide Number Placeholder 3"/>
+          <p:cNvSpPr>
+            <a:spLocks noGrp="1"/>
+          </p:cNvSpPr>
+          <p:nvPr>
+            <p:ph type="sldNum" sz="quarter" idx="10"/>
+          </p:nvPr>
+        </p:nvSpPr>
+        <p:spPr/>
+        <p:txBody>
+          <a:bodyPr/>
+          <a:lstStyle/>
+          <a:p>
+            <a:fld id="{F7021451-1387-4CA6-816F-3879F97B5CBC}" type="slidenum">
+              <a:rPr lang="en-US"/>
+              <a:t>16</a:t>
+            </a:fld>
+            <a:endParaRPr lang="en-US"/>
+          </a:p>
+        </p:txBody>
+      </p:sp>
+    </p:spTree>
+    <p:extLst>
+      <p:ext uri="{BB962C8B-B14F-4D97-AF65-F5344CB8AC3E}">
+        <p14:creationId xmlns:p14="http://schemas.microsoft.com/office/powerpoint/2010/main" val="1024086991"/>
+      </p:ext>
+    </p:extLst>
+  </p:cSld>
+  <p:clrMapOvr>
+    <a:masterClrMapping/>
+  </p:clrMapOvr>
+</p:notes>
+</file>
+
+<file path=ppt/notesSlides/notesSlide17.xml><?xml version="1.0" encoding="utf-8"?>
+<p:notes xmlns:a="http://schemas.openxmlformats.org/drawingml/2006/main" xmlns:r="http://schemas.openxmlformats.org/officeDocument/2006/relationships" xmlns:p="http://schemas.openxmlformats.org/presentationml/2006/main">
+  <p:cSld>
+    <p:spTree>
+      <p:nvGrpSpPr>
+        <p:cNvPr id="1" name=""/>
+        <p:cNvGrpSpPr/>
+        <p:nvPr/>
+      </p:nvGrpSpPr>
+      <p:grpSpPr>
+        <a:xfrm>
+          <a:off x="0" y="0"/>
+          <a:ext cx="0" cy="0"/>
+          <a:chOff x="0" y="0"/>
+          <a:chExt cx="0" cy="0"/>
+        </a:xfrm>
+      </p:grpSpPr>
+      <p:sp>
+        <p:nvSpPr>
+          <p:cNvPr id="2" name="Slide Image Placeholder 1"/>
+          <p:cNvSpPr>
+            <a:spLocks noGrp="1" noRot="1" noChangeAspect="1"/>
+          </p:cNvSpPr>
+          <p:nvPr>
+            <p:ph type="sldImg"/>
+          </p:nvPr>
+        </p:nvSpPr>
+        <p:spPr/>
+      </p:sp>
+      <p:sp>
+        <p:nvSpPr>
+          <p:cNvPr id="3" name="Notes Placeholder 2"/>
+          <p:cNvSpPr>
+            <a:spLocks noGrp="1"/>
+          </p:cNvSpPr>
+          <p:nvPr>
+            <p:ph type="body" idx="1"/>
+          </p:nvPr>
+        </p:nvSpPr>
+        <p:spPr/>
+        <p:txBody>
+          <a:bodyPr/>
+          <a:lstStyle/>
+          <a:p>
+            <a:r>
+              <a:rPr lang="en-US" dirty="0"/>
+              <a:t>To prevent us from having to write the full signature for a Result that uses our custom error type, we can create a type alias at the module root to shorten the signature.
+In rust, a `Box` is a smart pointer to a heap allocated value of a particular type. This is a value on the `stack` that holds the starting address of a contiguous region of `heap` memory as well as its length. When a box goes out of scope, its destructor is called, the inner object is destroyed, and the memory on the heap is freed. This prevents double free and use after free errors without any extra code.
+Rust must know the sizes of all values on the stack at compile time.
+Trait objects can vary greatly in size depending on what data structures
+they are implemented for. To make them all a known size at compile time,
+they are contained in a `Box`.</a:t>
+            </a:r>
+            <a:endParaRPr lang="en-US" dirty="0"/>
+          </a:p>
+        </p:txBody>
+      </p:sp>
+      <p:sp>
+        <p:nvSpPr>
+          <p:cNvPr id="4" name="Slide Number Placeholder 3"/>
+          <p:cNvSpPr>
+            <a:spLocks noGrp="1"/>
+          </p:cNvSpPr>
+          <p:nvPr>
+            <p:ph type="sldNum" sz="quarter" idx="10"/>
+          </p:nvPr>
+        </p:nvSpPr>
+        <p:spPr/>
+        <p:txBody>
+          <a:bodyPr/>
+          <a:lstStyle/>
+          <a:p>
+            <a:fld id="{F7021451-1387-4CA6-816F-3879F97B5CBC}" type="slidenum">
+              <a:rPr lang="en-US"/>
+              <a:t>17</a:t>
+            </a:fld>
+            <a:endParaRPr lang="en-US"/>
+          </a:p>
+        </p:txBody>
+      </p:sp>
+    </p:spTree>
+    <p:extLst>
+      <p:ext uri="{BB962C8B-B14F-4D97-AF65-F5344CB8AC3E}">
+        <p14:creationId xmlns:p14="http://schemas.microsoft.com/office/powerpoint/2010/main" val="1024086991"/>
+      </p:ext>
+    </p:extLst>
+  </p:cSld>
+  <p:clrMapOvr>
+    <a:masterClrMapping/>
+  </p:clrMapOvr>
+</p:notes>
+</file>
+
+<file path=ppt/notesSlides/notesSlide18.xml><?xml version="1.0" encoding="utf-8"?>
+<p:notes xmlns:a="http://schemas.openxmlformats.org/drawingml/2006/main" xmlns:r="http://schemas.openxmlformats.org/officeDocument/2006/relationships" xmlns:p="http://schemas.openxmlformats.org/presentationml/2006/main">
+  <p:cSld>
+    <p:spTree>
+      <p:nvGrpSpPr>
+        <p:cNvPr id="1" name=""/>
+        <p:cNvGrpSpPr/>
+        <p:nvPr/>
+      </p:nvGrpSpPr>
+      <p:grpSpPr>
+        <a:xfrm>
+          <a:off x="0" y="0"/>
+          <a:ext cx="0" cy="0"/>
+          <a:chOff x="0" y="0"/>
+          <a:chExt cx="0" cy="0"/>
+        </a:xfrm>
+      </p:grpSpPr>
+      <p:sp>
+        <p:nvSpPr>
+          <p:cNvPr id="2" name="Slide Image Placeholder 1"/>
+          <p:cNvSpPr>
+            <a:spLocks noGrp="1" noRot="1" noChangeAspect="1"/>
+          </p:cNvSpPr>
+          <p:nvPr>
+            <p:ph type="sldImg"/>
+          </p:nvPr>
+        </p:nvSpPr>
+        <p:spPr/>
+      </p:sp>
+      <p:sp>
+        <p:nvSpPr>
+          <p:cNvPr id="3" name="Notes Placeholder 2"/>
+          <p:cNvSpPr>
+            <a:spLocks noGrp="1"/>
+          </p:cNvSpPr>
+          <p:nvPr>
+            <p:ph type="body" idx="1"/>
+          </p:nvPr>
+        </p:nvSpPr>
+        <p:spPr/>
+        <p:txBody>
+          <a:bodyPr/>
+          <a:lstStyle/>
+          <a:p>
+            <a:r>
+              <a:rPr lang="en-US" dirty="0"/>
+              <a:t>With all that in mind, we can now write out methods for giving and taking a bone from a dog.</a:t>
+            </a:r>
+            <a:endParaRPr lang="en-US" dirty="0"/>
+          </a:p>
+        </p:txBody>
+      </p:sp>
+      <p:sp>
+        <p:nvSpPr>
+          <p:cNvPr id="4" name="Slide Number Placeholder 3"/>
+          <p:cNvSpPr>
+            <a:spLocks noGrp="1"/>
+          </p:cNvSpPr>
+          <p:nvPr>
+            <p:ph type="sldNum" sz="quarter" idx="10"/>
+          </p:nvPr>
+        </p:nvSpPr>
+        <p:spPr/>
+        <p:txBody>
+          <a:bodyPr/>
+          <a:lstStyle/>
+          <a:p>
+            <a:fld id="{F7021451-1387-4CA6-816F-3879F97B5CBC}" type="slidenum">
+              <a:rPr lang="en-US"/>
+              <a:t>18</a:t>
+            </a:fld>
+            <a:endParaRPr lang="en-US"/>
+          </a:p>
+        </p:txBody>
+      </p:sp>
+    </p:spTree>
+    <p:extLst>
+      <p:ext uri="{BB962C8B-B14F-4D97-AF65-F5344CB8AC3E}">
+        <p14:creationId xmlns:p14="http://schemas.microsoft.com/office/powerpoint/2010/main" val="1024086991"/>
+      </p:ext>
+    </p:extLst>
+  </p:cSld>
+  <p:clrMapOvr>
+    <a:masterClrMapping/>
+  </p:clrMapOvr>
+</p:notes>
+</file>
+
+<file path=ppt/notesSlides/notesSlide19.xml><?xml version="1.0" encoding="utf-8"?>
+<p:notes xmlns:a="http://schemas.openxmlformats.org/drawingml/2006/main" xmlns:r="http://schemas.openxmlformats.org/officeDocument/2006/relationships" xmlns:p="http://schemas.openxmlformats.org/presentationml/2006/main">
+  <p:cSld>
+    <p:spTree>
+      <p:nvGrpSpPr>
+        <p:cNvPr id="1" name=""/>
+        <p:cNvGrpSpPr/>
+        <p:nvPr/>
+      </p:nvGrpSpPr>
+      <p:grpSpPr>
+        <a:xfrm>
+          <a:off x="0" y="0"/>
+          <a:ext cx="0" cy="0"/>
+          <a:chOff x="0" y="0"/>
+          <a:chExt cx="0" cy="0"/>
+        </a:xfrm>
+      </p:grpSpPr>
+      <p:sp>
+        <p:nvSpPr>
+          <p:cNvPr id="2" name="Slide Image Placeholder 1"/>
+          <p:cNvSpPr>
+            <a:spLocks noGrp="1" noRot="1" noChangeAspect="1"/>
+          </p:cNvSpPr>
+          <p:nvPr>
+            <p:ph type="sldImg"/>
+          </p:nvPr>
+        </p:nvSpPr>
+        <p:spPr/>
+      </p:sp>
+      <p:sp>
+        <p:nvSpPr>
+          <p:cNvPr id="3" name="Notes Placeholder 2"/>
+          <p:cNvSpPr>
+            <a:spLocks noGrp="1"/>
+          </p:cNvSpPr>
+          <p:nvPr>
+            <p:ph type="body" idx="1"/>
+          </p:nvPr>
+        </p:nvSpPr>
+        <p:spPr/>
+        <p:txBody>
+          <a:bodyPr/>
+          <a:lstStyle/>
+          <a:p>
+            <a:r>
+              <a:rPr lang="en-US" dirty="0"/>
+              <a:t>Naturally, the dog won't be able to speak while holding the bone. So let's add that now.</a:t>
+            </a:r>
+            <a:endParaRPr lang="en-US" dirty="0"/>
+          </a:p>
+        </p:txBody>
+      </p:sp>
+      <p:sp>
+        <p:nvSpPr>
+          <p:cNvPr id="4" name="Slide Number Placeholder 3"/>
+          <p:cNvSpPr>
+            <a:spLocks noGrp="1"/>
+          </p:cNvSpPr>
+          <p:nvPr>
+            <p:ph type="sldNum" sz="quarter" idx="10"/>
+          </p:nvPr>
+        </p:nvSpPr>
+        <p:spPr/>
+        <p:txBody>
+          <a:bodyPr/>
+          <a:lstStyle/>
+          <a:p>
+            <a:fld id="{F7021451-1387-4CA6-816F-3879F97B5CBC}" type="slidenum">
+              <a:rPr lang="en-US"/>
+              <a:t>19</a:t>
+            </a:fld>
+            <a:endParaRPr lang="en-US"/>
+          </a:p>
+        </p:txBody>
+      </p:sp>
+    </p:spTree>
+    <p:extLst>
+      <p:ext uri="{BB962C8B-B14F-4D97-AF65-F5344CB8AC3E}">
+        <p14:creationId xmlns:p14="http://schemas.microsoft.com/office/powerpoint/2010/main" val="1024086991"/>
+      </p:ext>
+    </p:extLst>
+  </p:cSld>
+  <p:clrMapOvr>
+    <a:masterClrMapping/>
+  </p:clrMapOvr>
+</p:notes>
+</file>
+
 <file path=ppt/notesSlides/notesSlide2.xml><?xml version="1.0" encoding="utf-8"?>
 <p:notes xmlns:a="http://schemas.openxmlformats.org/drawingml/2006/main" xmlns:r="http://schemas.openxmlformats.org/officeDocument/2006/relationships" xmlns:p="http://schemas.openxmlformats.org/presentationml/2006/main">
   <p:cSld>
@@ -1004,7 +1553,187 @@
 </p:notes>
 </file>
 
-<file path=ppt/notesSlides/notesSlide3.xml><?xml version="1.0" encoding="utf-8"?>
+<file path=ppt/notesSlides/notesSlide20.xml><?xml version="1.0" encoding="utf-8"?>
+<p:notes xmlns:a="http://schemas.openxmlformats.org/drawingml/2006/main" xmlns:r="http://schemas.openxmlformats.org/officeDocument/2006/relationships" xmlns:p="http://schemas.openxmlformats.org/presentationml/2006/main">
+  <p:cSld>
+    <p:spTree>
+      <p:nvGrpSpPr>
+        <p:cNvPr id="1" name=""/>
+        <p:cNvGrpSpPr/>
+        <p:nvPr/>
+      </p:nvGrpSpPr>
+      <p:grpSpPr>
+        <a:xfrm>
+          <a:off x="0" y="0"/>
+          <a:ext cx="0" cy="0"/>
+          <a:chOff x="0" y="0"/>
+          <a:chExt cx="0" cy="0"/>
+        </a:xfrm>
+      </p:grpSpPr>
+      <p:sp>
+        <p:nvSpPr>
+          <p:cNvPr id="2" name="Slide Image Placeholder 1"/>
+          <p:cNvSpPr>
+            <a:spLocks noGrp="1" noRot="1" noChangeAspect="1"/>
+          </p:cNvSpPr>
+          <p:nvPr>
+            <p:ph type="sldImg"/>
+          </p:nvPr>
+        </p:nvSpPr>
+        <p:spPr/>
+      </p:sp>
+      <p:sp>
+        <p:nvSpPr>
+          <p:cNvPr id="3" name="Notes Placeholder 2"/>
+          <p:cNvSpPr>
+            <a:spLocks noGrp="1"/>
+          </p:cNvSpPr>
+          <p:nvPr>
+            <p:ph type="body" idx="1"/>
+          </p:nvPr>
+        </p:nvSpPr>
+        <p:spPr/>
+        <p:txBody>
+          <a:bodyPr/>
+          <a:lstStyle/>
+          <a:p>
+            <a:r>
+              <a:rPr lang="en-US" dirty="0"/>
+              <a:t>Now we can invoke these methods in main with a slight change to the return type of main.
+Note that the ? operator can invoke fallible methods and forward their errors to the caller if they fail. We can call dog.speak()? now because main has a return type of Result&lt;()&gt;.
+The function must return a Result, so at the end we use the Ok() variant of Result
+with the empty type represented by a pair of parentheses like in the signature.</a:t>
+            </a:r>
+            <a:endParaRPr lang="en-US" dirty="0"/>
+          </a:p>
+        </p:txBody>
+      </p:sp>
+      <p:sp>
+        <p:nvSpPr>
+          <p:cNvPr id="4" name="Slide Number Placeholder 3"/>
+          <p:cNvSpPr>
+            <a:spLocks noGrp="1"/>
+          </p:cNvSpPr>
+          <p:nvPr>
+            <p:ph type="sldNum" sz="quarter" idx="10"/>
+          </p:nvPr>
+        </p:nvSpPr>
+        <p:spPr/>
+        <p:txBody>
+          <a:bodyPr/>
+          <a:lstStyle/>
+          <a:p>
+            <a:fld id="{F7021451-1387-4CA6-816F-3879F97B5CBC}" type="slidenum">
+              <a:rPr lang="en-US"/>
+              <a:t>20</a:t>
+            </a:fld>
+            <a:endParaRPr lang="en-US"/>
+          </a:p>
+        </p:txBody>
+      </p:sp>
+    </p:spTree>
+    <p:extLst>
+      <p:ext uri="{BB962C8B-B14F-4D97-AF65-F5344CB8AC3E}">
+        <p14:creationId xmlns:p14="http://schemas.microsoft.com/office/powerpoint/2010/main" val="1024086991"/>
+      </p:ext>
+    </p:extLst>
+  </p:cSld>
+  <p:clrMapOvr>
+    <a:masterClrMapping/>
+  </p:clrMapOvr>
+</p:notes>
+</file>
+
+<file path=ppt/notesSlides/notesSlide21.xml><?xml version="1.0" encoding="utf-8"?>
+<p:notes xmlns:a="http://schemas.openxmlformats.org/drawingml/2006/main" xmlns:r="http://schemas.openxmlformats.org/officeDocument/2006/relationships" xmlns:p="http://schemas.openxmlformats.org/presentationml/2006/main">
+  <p:cSld>
+    <p:spTree>
+      <p:nvGrpSpPr>
+        <p:cNvPr id="1" name=""/>
+        <p:cNvGrpSpPr/>
+        <p:nvPr/>
+      </p:nvGrpSpPr>
+      <p:grpSpPr>
+        <a:xfrm>
+          <a:off x="0" y="0"/>
+          <a:ext cx="0" cy="0"/>
+          <a:chOff x="0" y="0"/>
+          <a:chExt cx="0" cy="0"/>
+        </a:xfrm>
+      </p:grpSpPr>
+      <p:sp>
+        <p:nvSpPr>
+          <p:cNvPr id="2" name="Slide Image Placeholder 1"/>
+          <p:cNvSpPr>
+            <a:spLocks noGrp="1" noRot="1" noChangeAspect="1"/>
+          </p:cNvSpPr>
+          <p:nvPr>
+            <p:ph type="sldImg"/>
+          </p:nvPr>
+        </p:nvSpPr>
+        <p:spPr/>
+      </p:sp>
+      <p:sp>
+        <p:nvSpPr>
+          <p:cNvPr id="3" name="Notes Placeholder 2"/>
+          <p:cNvSpPr>
+            <a:spLocks noGrp="1"/>
+          </p:cNvSpPr>
+          <p:nvPr>
+            <p:ph type="body" idx="1"/>
+          </p:nvPr>
+        </p:nvSpPr>
+        <p:spPr/>
+        <p:txBody>
+          <a:bodyPr/>
+          <a:lstStyle/>
+          <a:p>
+            <a:r>
+              <a:rPr lang="en-US" dirty="0"/>
+              <a:t>Earlier we mentioned that we could get debug representations of types by implementing the Debug trait.
+Add the #[derive(Debug)] attribute to any struct or plain enum you want to print debug string output for. Its members must also all implement Debug, and Debug is already implemented for all primitives and most types from the standard library.</a:t>
+            </a:r>
+            <a:endParaRPr lang="en-US" dirty="0"/>
+          </a:p>
+        </p:txBody>
+      </p:sp>
+      <p:sp>
+        <p:nvSpPr>
+          <p:cNvPr id="4" name="Slide Number Placeholder 3"/>
+          <p:cNvSpPr>
+            <a:spLocks noGrp="1"/>
+          </p:cNvSpPr>
+          <p:nvPr>
+            <p:ph type="sldNum" sz="quarter" idx="10"/>
+          </p:nvPr>
+        </p:nvSpPr>
+        <p:spPr/>
+        <p:txBody>
+          <a:bodyPr/>
+          <a:lstStyle/>
+          <a:p>
+            <a:fld id="{F7021451-1387-4CA6-816F-3879F97B5CBC}" type="slidenum">
+              <a:rPr lang="en-US"/>
+              <a:t>21</a:t>
+            </a:fld>
+            <a:endParaRPr lang="en-US"/>
+          </a:p>
+        </p:txBody>
+      </p:sp>
+    </p:spTree>
+    <p:extLst>
+      <p:ext uri="{BB962C8B-B14F-4D97-AF65-F5344CB8AC3E}">
+        <p14:creationId xmlns:p14="http://schemas.microsoft.com/office/powerpoint/2010/main" val="1024086991"/>
+      </p:ext>
+    </p:extLst>
+  </p:cSld>
+  <p:clrMapOvr>
+    <a:masterClrMapping/>
+  </p:clrMapOvr>
+</p:notes>
+</file>
+
+<file path=ppt/notesSlides/notesSlide22.xml><?xml version="1.0" encoding="utf-8"?>
 <p:notes xmlns:a="http://schemas.openxmlformats.org/drawingml/2006/main" xmlns:r="http://schemas.openxmlformats.org/officeDocument/2006/relationships" xmlns:p="http://schemas.openxmlformats.org/presentationml/2006/main">
   <p:cSld>
     <p:spTree>
@@ -1073,7 +1802,7 @@
           <a:p>
             <a:fld id="{F7021451-1387-4CA6-816F-3879F97B5CBC}" type="slidenum">
               <a:rPr lang="en-US"/>
-              <a:t>3</a:t>
+              <a:t>22</a:t>
             </a:fld>
             <a:endParaRPr lang="en-US"/>
           </a:p>
@@ -1092,6 +1821,182 @@
 </p:notes>
 </file>
 
+<file path=ppt/notesSlides/notesSlide23.xml><?xml version="1.0" encoding="utf-8"?>
+<p:notes xmlns:a="http://schemas.openxmlformats.org/drawingml/2006/main" xmlns:r="http://schemas.openxmlformats.org/officeDocument/2006/relationships" xmlns:p="http://schemas.openxmlformats.org/presentationml/2006/main">
+  <p:cSld>
+    <p:spTree>
+      <p:nvGrpSpPr>
+        <p:cNvPr id="1" name=""/>
+        <p:cNvGrpSpPr/>
+        <p:nvPr/>
+      </p:nvGrpSpPr>
+      <p:grpSpPr>
+        <a:xfrm>
+          <a:off x="0" y="0"/>
+          <a:ext cx="0" cy="0"/>
+          <a:chOff x="0" y="0"/>
+          <a:chExt cx="0" cy="0"/>
+        </a:xfrm>
+      </p:grpSpPr>
+      <p:sp>
+        <p:nvSpPr>
+          <p:cNvPr id="2" name="Slide Image Placeholder 1"/>
+          <p:cNvSpPr>
+            <a:spLocks noGrp="1" noRot="1" noChangeAspect="1"/>
+          </p:cNvSpPr>
+          <p:nvPr>
+            <p:ph type="sldImg"/>
+          </p:nvPr>
+        </p:nvSpPr>
+        <p:spPr/>
+      </p:sp>
+      <p:sp>
+        <p:nvSpPr>
+          <p:cNvPr id="3" name="Notes Placeholder 2"/>
+          <p:cNvSpPr>
+            <a:spLocks noGrp="1"/>
+          </p:cNvSpPr>
+          <p:nvPr>
+            <p:ph type="body" idx="1"/>
+          </p:nvPr>
+        </p:nvSpPr>
+        <p:spPr/>
+        <p:txBody>
+          <a:bodyPr/>
+          <a:lstStyle/>
+          <a:p>
+            <a:r>
+              <a:rPr lang="en-US" dirty="0"/>
+              <a:t>Rustup doc will open a page in the browser containing a large collection of standard, official documentation and rust learning resources.</a:t>
+            </a:r>
+            <a:endParaRPr lang="en-US" dirty="0"/>
+          </a:p>
+        </p:txBody>
+      </p:sp>
+      <p:sp>
+        <p:nvSpPr>
+          <p:cNvPr id="4" name="Slide Number Placeholder 3"/>
+          <p:cNvSpPr>
+            <a:spLocks noGrp="1"/>
+          </p:cNvSpPr>
+          <p:nvPr>
+            <p:ph type="sldNum" sz="quarter" idx="10"/>
+          </p:nvPr>
+        </p:nvSpPr>
+        <p:spPr/>
+        <p:txBody>
+          <a:bodyPr/>
+          <a:lstStyle/>
+          <a:p>
+            <a:fld id="{F7021451-1387-4CA6-816F-3879F97B5CBC}" type="slidenum">
+              <a:rPr lang="en-US"/>
+              <a:t>23</a:t>
+            </a:fld>
+            <a:endParaRPr lang="en-US"/>
+          </a:p>
+        </p:txBody>
+      </p:sp>
+    </p:spTree>
+    <p:extLst>
+      <p:ext uri="{BB962C8B-B14F-4D97-AF65-F5344CB8AC3E}">
+        <p14:creationId xmlns:p14="http://schemas.microsoft.com/office/powerpoint/2010/main" val="1024086991"/>
+      </p:ext>
+    </p:extLst>
+  </p:cSld>
+  <p:clrMapOvr>
+    <a:masterClrMapping/>
+  </p:clrMapOvr>
+</p:notes>
+</file>
+
+<file path=ppt/notesSlides/notesSlide3.xml><?xml version="1.0" encoding="utf-8"?>
+<p:notes xmlns:a="http://schemas.openxmlformats.org/drawingml/2006/main" xmlns:r="http://schemas.openxmlformats.org/officeDocument/2006/relationships" xmlns:p="http://schemas.openxmlformats.org/presentationml/2006/main">
+  <p:cSld>
+    <p:spTree>
+      <p:nvGrpSpPr>
+        <p:cNvPr id="1" name=""/>
+        <p:cNvGrpSpPr/>
+        <p:nvPr/>
+      </p:nvGrpSpPr>
+      <p:grpSpPr>
+        <a:xfrm>
+          <a:off x="0" y="0"/>
+          <a:ext cx="0" cy="0"/>
+          <a:chOff x="0" y="0"/>
+          <a:chExt cx="0" cy="0"/>
+        </a:xfrm>
+      </p:grpSpPr>
+      <p:sp>
+        <p:nvSpPr>
+          <p:cNvPr id="2" name="Slide Image Placeholder 1"/>
+          <p:cNvSpPr>
+            <a:spLocks noGrp="1" noRot="1" noChangeAspect="1"/>
+          </p:cNvSpPr>
+          <p:nvPr>
+            <p:ph type="sldImg"/>
+          </p:nvPr>
+        </p:nvSpPr>
+        <p:spPr/>
+      </p:sp>
+      <p:sp>
+        <p:nvSpPr>
+          <p:cNvPr id="3" name="Notes Placeholder 2"/>
+          <p:cNvSpPr>
+            <a:spLocks noGrp="1"/>
+          </p:cNvSpPr>
+          <p:nvPr>
+            <p:ph type="body" idx="1"/>
+          </p:nvPr>
+        </p:nvSpPr>
+        <p:spPr/>
+        <p:txBody>
+          <a:bodyPr/>
+          <a:lstStyle/>
+          <a:p>
+            <a:r>
+              <a:rPr lang="en-US" dirty="0"/>
+              <a:t/>
+            </a:r>
+            <a:endParaRPr lang="en-US" dirty="0"/>
+          </a:p>
+        </p:txBody>
+      </p:sp>
+      <p:sp>
+        <p:nvSpPr>
+          <p:cNvPr id="4" name="Slide Number Placeholder 3"/>
+          <p:cNvSpPr>
+            <a:spLocks noGrp="1"/>
+          </p:cNvSpPr>
+          <p:nvPr>
+            <p:ph type="sldNum" sz="quarter" idx="10"/>
+          </p:nvPr>
+        </p:nvSpPr>
+        <p:spPr/>
+        <p:txBody>
+          <a:bodyPr/>
+          <a:lstStyle/>
+          <a:p>
+            <a:fld id="{F7021451-1387-4CA6-816F-3879F97B5CBC}" type="slidenum">
+              <a:rPr lang="en-US"/>
+              <a:t>3</a:t>
+            </a:fld>
+            <a:endParaRPr lang="en-US"/>
+          </a:p>
+        </p:txBody>
+      </p:sp>
+    </p:spTree>
+    <p:extLst>
+      <p:ext uri="{BB962C8B-B14F-4D97-AF65-F5344CB8AC3E}">
+        <p14:creationId xmlns:p14="http://schemas.microsoft.com/office/powerpoint/2010/main" val="1024086991"/>
+      </p:ext>
+    </p:extLst>
+  </p:cSld>
+  <p:clrMapOvr>
+    <a:masterClrMapping/>
+  </p:clrMapOvr>
+</p:notes>
+</file>
+
 <file path=ppt/notesSlides/notesSlide4.xml><?xml version="1.0" encoding="utf-8"?>
 <p:notes xmlns:a="http://schemas.openxmlformats.org/drawingml/2006/main" xmlns:r="http://schemas.openxmlformats.org/officeDocument/2006/relationships" xmlns:p="http://schemas.openxmlformats.org/presentationml/2006/main">
   <p:cSld>
@@ -1138,7 +2043,8 @@
           <a:p>
             <a:r>
               <a:rPr lang="en-US" dirty="0"/>
-              <a:t/>
+              <a:t>&gt;
+  - Language server for rust that provides IDE like features using JSON-RPC with editor plugins that support Microsoft's language server schema.</a:t>
             </a:r>
             <a:endParaRPr lang="en-US" dirty="0"/>
           </a:p>
@@ -2126,9 +3032,399 @@
 </p:sld>
 </file>
 
+<file path=ppt/slides/slide14.xml><?xml version="1.0" encoding="utf-8"?>
+<p:sld xmlns:a="http://schemas.openxmlformats.org/drawingml/2006/main" xmlns:r="http://schemas.openxmlformats.org/officeDocument/2006/relationships" xmlns:p="http://schemas.openxmlformats.org/presentationml/2006/main">
+  <p:cSld name="Slide 14">
+    <p:bg>
+      <p:bgPr>
+        <a:blipFill dpi="0" rotWithShape="1">
+          <a:blip r:embed="rId1">
+            <a:lum/>
+          </a:blip>
+          <a:srcRect/>
+          <a:stretch>
+            <a:fillRect/>
+          </a:stretch>
+        </a:blipFill>
+        <a:effectLst/>
+      </p:bgPr>
+    </p:bg>
+    <p:spTree>
+      <p:nvGrpSpPr>
+        <p:cNvPr id="1" name=""/>
+        <p:cNvGrpSpPr/>
+        <p:nvPr/>
+      </p:nvGrpSpPr>
+      <p:grpSpPr>
+        <a:xfrm>
+          <a:off x="0" y="0"/>
+          <a:ext cx="0" cy="0"/>
+          <a:chOff x="0" y="0"/>
+          <a:chExt cx="0" cy="0"/>
+        </a:xfrm>
+      </p:grpSpPr>
+    </p:spTree>
+  </p:cSld>
+  <p:clrMapOvr>
+    <a:masterClrMapping/>
+  </p:clrMapOvr>
+</p:sld>
+</file>
+
+<file path=ppt/slides/slide15.xml><?xml version="1.0" encoding="utf-8"?>
+<p:sld xmlns:a="http://schemas.openxmlformats.org/drawingml/2006/main" xmlns:r="http://schemas.openxmlformats.org/officeDocument/2006/relationships" xmlns:p="http://schemas.openxmlformats.org/presentationml/2006/main">
+  <p:cSld name="Slide 15">
+    <p:bg>
+      <p:bgPr>
+        <a:blipFill dpi="0" rotWithShape="1">
+          <a:blip r:embed="rId1">
+            <a:lum/>
+          </a:blip>
+          <a:srcRect/>
+          <a:stretch>
+            <a:fillRect/>
+          </a:stretch>
+        </a:blipFill>
+        <a:effectLst/>
+      </p:bgPr>
+    </p:bg>
+    <p:spTree>
+      <p:nvGrpSpPr>
+        <p:cNvPr id="1" name=""/>
+        <p:cNvGrpSpPr/>
+        <p:nvPr/>
+      </p:nvGrpSpPr>
+      <p:grpSpPr>
+        <a:xfrm>
+          <a:off x="0" y="0"/>
+          <a:ext cx="0" cy="0"/>
+          <a:chOff x="0" y="0"/>
+          <a:chExt cx="0" cy="0"/>
+        </a:xfrm>
+      </p:grpSpPr>
+    </p:spTree>
+  </p:cSld>
+  <p:clrMapOvr>
+    <a:masterClrMapping/>
+  </p:clrMapOvr>
+</p:sld>
+</file>
+
+<file path=ppt/slides/slide16.xml><?xml version="1.0" encoding="utf-8"?>
+<p:sld xmlns:a="http://schemas.openxmlformats.org/drawingml/2006/main" xmlns:r="http://schemas.openxmlformats.org/officeDocument/2006/relationships" xmlns:p="http://schemas.openxmlformats.org/presentationml/2006/main">
+  <p:cSld name="Slide 16">
+    <p:bg>
+      <p:bgPr>
+        <a:blipFill dpi="0" rotWithShape="1">
+          <a:blip r:embed="rId1">
+            <a:lum/>
+          </a:blip>
+          <a:srcRect/>
+          <a:stretch>
+            <a:fillRect/>
+          </a:stretch>
+        </a:blipFill>
+        <a:effectLst/>
+      </p:bgPr>
+    </p:bg>
+    <p:spTree>
+      <p:nvGrpSpPr>
+        <p:cNvPr id="1" name=""/>
+        <p:cNvGrpSpPr/>
+        <p:nvPr/>
+      </p:nvGrpSpPr>
+      <p:grpSpPr>
+        <a:xfrm>
+          <a:off x="0" y="0"/>
+          <a:ext cx="0" cy="0"/>
+          <a:chOff x="0" y="0"/>
+          <a:chExt cx="0" cy="0"/>
+        </a:xfrm>
+      </p:grpSpPr>
+    </p:spTree>
+  </p:cSld>
+  <p:clrMapOvr>
+    <a:masterClrMapping/>
+  </p:clrMapOvr>
+</p:sld>
+</file>
+
+<file path=ppt/slides/slide17.xml><?xml version="1.0" encoding="utf-8"?>
+<p:sld xmlns:a="http://schemas.openxmlformats.org/drawingml/2006/main" xmlns:r="http://schemas.openxmlformats.org/officeDocument/2006/relationships" xmlns:p="http://schemas.openxmlformats.org/presentationml/2006/main">
+  <p:cSld name="Slide 17">
+    <p:bg>
+      <p:bgPr>
+        <a:blipFill dpi="0" rotWithShape="1">
+          <a:blip r:embed="rId1">
+            <a:lum/>
+          </a:blip>
+          <a:srcRect/>
+          <a:stretch>
+            <a:fillRect/>
+          </a:stretch>
+        </a:blipFill>
+        <a:effectLst/>
+      </p:bgPr>
+    </p:bg>
+    <p:spTree>
+      <p:nvGrpSpPr>
+        <p:cNvPr id="1" name=""/>
+        <p:cNvGrpSpPr/>
+        <p:nvPr/>
+      </p:nvGrpSpPr>
+      <p:grpSpPr>
+        <a:xfrm>
+          <a:off x="0" y="0"/>
+          <a:ext cx="0" cy="0"/>
+          <a:chOff x="0" y="0"/>
+          <a:chExt cx="0" cy="0"/>
+        </a:xfrm>
+      </p:grpSpPr>
+    </p:spTree>
+  </p:cSld>
+  <p:clrMapOvr>
+    <a:masterClrMapping/>
+  </p:clrMapOvr>
+</p:sld>
+</file>
+
+<file path=ppt/slides/slide18.xml><?xml version="1.0" encoding="utf-8"?>
+<p:sld xmlns:a="http://schemas.openxmlformats.org/drawingml/2006/main" xmlns:r="http://schemas.openxmlformats.org/officeDocument/2006/relationships" xmlns:p="http://schemas.openxmlformats.org/presentationml/2006/main">
+  <p:cSld name="Slide 18">
+    <p:bg>
+      <p:bgPr>
+        <a:blipFill dpi="0" rotWithShape="1">
+          <a:blip r:embed="rId1">
+            <a:lum/>
+          </a:blip>
+          <a:srcRect/>
+          <a:stretch>
+            <a:fillRect/>
+          </a:stretch>
+        </a:blipFill>
+        <a:effectLst/>
+      </p:bgPr>
+    </p:bg>
+    <p:spTree>
+      <p:nvGrpSpPr>
+        <p:cNvPr id="1" name=""/>
+        <p:cNvGrpSpPr/>
+        <p:nvPr/>
+      </p:nvGrpSpPr>
+      <p:grpSpPr>
+        <a:xfrm>
+          <a:off x="0" y="0"/>
+          <a:ext cx="0" cy="0"/>
+          <a:chOff x="0" y="0"/>
+          <a:chExt cx="0" cy="0"/>
+        </a:xfrm>
+      </p:grpSpPr>
+    </p:spTree>
+  </p:cSld>
+  <p:clrMapOvr>
+    <a:masterClrMapping/>
+  </p:clrMapOvr>
+</p:sld>
+</file>
+
+<file path=ppt/slides/slide19.xml><?xml version="1.0" encoding="utf-8"?>
+<p:sld xmlns:a="http://schemas.openxmlformats.org/drawingml/2006/main" xmlns:r="http://schemas.openxmlformats.org/officeDocument/2006/relationships" xmlns:p="http://schemas.openxmlformats.org/presentationml/2006/main">
+  <p:cSld name="Slide 19">
+    <p:bg>
+      <p:bgPr>
+        <a:blipFill dpi="0" rotWithShape="1">
+          <a:blip r:embed="rId1">
+            <a:lum/>
+          </a:blip>
+          <a:srcRect/>
+          <a:stretch>
+            <a:fillRect/>
+          </a:stretch>
+        </a:blipFill>
+        <a:effectLst/>
+      </p:bgPr>
+    </p:bg>
+    <p:spTree>
+      <p:nvGrpSpPr>
+        <p:cNvPr id="1" name=""/>
+        <p:cNvGrpSpPr/>
+        <p:nvPr/>
+      </p:nvGrpSpPr>
+      <p:grpSpPr>
+        <a:xfrm>
+          <a:off x="0" y="0"/>
+          <a:ext cx="0" cy="0"/>
+          <a:chOff x="0" y="0"/>
+          <a:chExt cx="0" cy="0"/>
+        </a:xfrm>
+      </p:grpSpPr>
+    </p:spTree>
+  </p:cSld>
+  <p:clrMapOvr>
+    <a:masterClrMapping/>
+  </p:clrMapOvr>
+</p:sld>
+</file>
+
 <file path=ppt/slides/slide2.xml><?xml version="1.0" encoding="utf-8"?>
 <p:sld xmlns:a="http://schemas.openxmlformats.org/drawingml/2006/main" xmlns:r="http://schemas.openxmlformats.org/officeDocument/2006/relationships" xmlns:p="http://schemas.openxmlformats.org/presentationml/2006/main">
   <p:cSld name="Slide 2">
+    <p:bg>
+      <p:bgPr>
+        <a:blipFill dpi="0" rotWithShape="1">
+          <a:blip r:embed="rId1">
+            <a:lum/>
+          </a:blip>
+          <a:srcRect/>
+          <a:stretch>
+            <a:fillRect/>
+          </a:stretch>
+        </a:blipFill>
+        <a:effectLst/>
+      </p:bgPr>
+    </p:bg>
+    <p:spTree>
+      <p:nvGrpSpPr>
+        <p:cNvPr id="1" name=""/>
+        <p:cNvGrpSpPr/>
+        <p:nvPr/>
+      </p:nvGrpSpPr>
+      <p:grpSpPr>
+        <a:xfrm>
+          <a:off x="0" y="0"/>
+          <a:ext cx="0" cy="0"/>
+          <a:chOff x="0" y="0"/>
+          <a:chExt cx="0" cy="0"/>
+        </a:xfrm>
+      </p:grpSpPr>
+    </p:spTree>
+  </p:cSld>
+  <p:clrMapOvr>
+    <a:masterClrMapping/>
+  </p:clrMapOvr>
+</p:sld>
+</file>
+
+<file path=ppt/slides/slide20.xml><?xml version="1.0" encoding="utf-8"?>
+<p:sld xmlns:a="http://schemas.openxmlformats.org/drawingml/2006/main" xmlns:r="http://schemas.openxmlformats.org/officeDocument/2006/relationships" xmlns:p="http://schemas.openxmlformats.org/presentationml/2006/main">
+  <p:cSld name="Slide 20">
+    <p:bg>
+      <p:bgPr>
+        <a:blipFill dpi="0" rotWithShape="1">
+          <a:blip r:embed="rId1">
+            <a:lum/>
+          </a:blip>
+          <a:srcRect/>
+          <a:stretch>
+            <a:fillRect/>
+          </a:stretch>
+        </a:blipFill>
+        <a:effectLst/>
+      </p:bgPr>
+    </p:bg>
+    <p:spTree>
+      <p:nvGrpSpPr>
+        <p:cNvPr id="1" name=""/>
+        <p:cNvGrpSpPr/>
+        <p:nvPr/>
+      </p:nvGrpSpPr>
+      <p:grpSpPr>
+        <a:xfrm>
+          <a:off x="0" y="0"/>
+          <a:ext cx="0" cy="0"/>
+          <a:chOff x="0" y="0"/>
+          <a:chExt cx="0" cy="0"/>
+        </a:xfrm>
+      </p:grpSpPr>
+    </p:spTree>
+  </p:cSld>
+  <p:clrMapOvr>
+    <a:masterClrMapping/>
+  </p:clrMapOvr>
+</p:sld>
+</file>
+
+<file path=ppt/slides/slide21.xml><?xml version="1.0" encoding="utf-8"?>
+<p:sld xmlns:a="http://schemas.openxmlformats.org/drawingml/2006/main" xmlns:r="http://schemas.openxmlformats.org/officeDocument/2006/relationships" xmlns:p="http://schemas.openxmlformats.org/presentationml/2006/main">
+  <p:cSld name="Slide 21">
+    <p:bg>
+      <p:bgPr>
+        <a:blipFill dpi="0" rotWithShape="1">
+          <a:blip r:embed="rId1">
+            <a:lum/>
+          </a:blip>
+          <a:srcRect/>
+          <a:stretch>
+            <a:fillRect/>
+          </a:stretch>
+        </a:blipFill>
+        <a:effectLst/>
+      </p:bgPr>
+    </p:bg>
+    <p:spTree>
+      <p:nvGrpSpPr>
+        <p:cNvPr id="1" name=""/>
+        <p:cNvGrpSpPr/>
+        <p:nvPr/>
+      </p:nvGrpSpPr>
+      <p:grpSpPr>
+        <a:xfrm>
+          <a:off x="0" y="0"/>
+          <a:ext cx="0" cy="0"/>
+          <a:chOff x="0" y="0"/>
+          <a:chExt cx="0" cy="0"/>
+        </a:xfrm>
+      </p:grpSpPr>
+    </p:spTree>
+  </p:cSld>
+  <p:clrMapOvr>
+    <a:masterClrMapping/>
+  </p:clrMapOvr>
+</p:sld>
+</file>
+
+<file path=ppt/slides/slide22.xml><?xml version="1.0" encoding="utf-8"?>
+<p:sld xmlns:a="http://schemas.openxmlformats.org/drawingml/2006/main" xmlns:r="http://schemas.openxmlformats.org/officeDocument/2006/relationships" xmlns:p="http://schemas.openxmlformats.org/presentationml/2006/main">
+  <p:cSld name="Slide 22">
+    <p:bg>
+      <p:bgPr>
+        <a:blipFill dpi="0" rotWithShape="1">
+          <a:blip r:embed="rId1">
+            <a:lum/>
+          </a:blip>
+          <a:srcRect/>
+          <a:stretch>
+            <a:fillRect/>
+          </a:stretch>
+        </a:blipFill>
+        <a:effectLst/>
+      </p:bgPr>
+    </p:bg>
+    <p:spTree>
+      <p:nvGrpSpPr>
+        <p:cNvPr id="1" name=""/>
+        <p:cNvGrpSpPr/>
+        <p:nvPr/>
+      </p:nvGrpSpPr>
+      <p:grpSpPr>
+        <a:xfrm>
+          <a:off x="0" y="0"/>
+          <a:ext cx="0" cy="0"/>
+          <a:chOff x="0" y="0"/>
+          <a:chExt cx="0" cy="0"/>
+        </a:xfrm>
+      </p:grpSpPr>
+    </p:spTree>
+  </p:cSld>
+  <p:clrMapOvr>
+    <a:masterClrMapping/>
+  </p:clrMapOvr>
+</p:sld>
+</file>
+
+<file path=ppt/slides/slide23.xml><?xml version="1.0" encoding="utf-8"?>
+<p:sld xmlns:a="http://schemas.openxmlformats.org/drawingml/2006/main" xmlns:r="http://schemas.openxmlformats.org/officeDocument/2006/relationships" xmlns:p="http://schemas.openxmlformats.org/presentationml/2006/main">
+  <p:cSld name="Slide 23">
     <p:bg>
       <p:bgPr>
         <a:blipFill dpi="0" rotWithShape="1">

</xml_diff>

<commit_message>
Deploying to gh-pages from @ matthewjberger/trust@c9547c251ff4661c20da1eb28fe05ac7944316cf 🚀
</commit_message>
<xml_diff>
--- a/README.pptx
+++ b/README.pptx
@@ -32,8 +32,8 @@
   <p:notesMasterIdLst>
     <p:notesMasterId r:id="rId25"/>
   </p:notesMasterIdLst>
-  <p:sldSz cx="12192000" cy="6858000"/>
-  <p:notesSz cx="6858000" cy="12192000"/>
+  <p:sldSz cx="9144000" cy="6858000"/>
+  <p:notesSz cx="6858000" cy="9144000"/>
   <p:defaultTextStyle>
     <a:lvl1pPr marL="0" algn="l" defTabSz="914400" rtl="0" eaLnBrk="1" latinLnBrk="0" hangingPunct="1">
       <a:defRPr sz="1800" kern="1200">

</xml_diff>